<commit_message>
worked on slide show presintation
</commit_message>
<xml_diff>
--- a/SlideShow/Data Analytics Final Presentation.pptx
+++ b/SlideShow/Data Analytics Final Presentation.pptx
@@ -2,28 +2,34 @@
 <file path=ppt/presentation.xml><?xml version="1.0" encoding="utf-8"?>
 <p:presentation xmlns:a="http://schemas.openxmlformats.org/drawingml/2006/main" xmlns:r="http://schemas.openxmlformats.org/officeDocument/2006/relationships" xmlns:mc="http://schemas.openxmlformats.org/markup-compatibility/2006" xmlns:mv="urn:schemas-microsoft-com:mac:vml" xmlns:p="http://schemas.openxmlformats.org/presentationml/2006/main" xmlns:c="http://schemas.openxmlformats.org/drawingml/2006/chart" xmlns:dgm="http://schemas.openxmlformats.org/drawingml/2006/diagram" xmlns:o="urn:schemas-microsoft-com:office:office" xmlns:v="urn:schemas-microsoft-com:vml" xmlns:pvml="urn:schemas-microsoft-com:office:powerpoint" xmlns:com="http://schemas.openxmlformats.org/drawingml/2006/compatibility" xmlns:p14="http://schemas.microsoft.com/office/powerpoint/2010/main" xmlns:p15="http://schemas.microsoft.com/office/powerpoint/2012/main" xmlns:ahyp="http://schemas.microsoft.com/office/drawing/2018/hyperlinkcolor" autoCompressPictures="0" embedTrueTypeFonts="1" strictFirstAndLastChars="0" saveSubsetFonts="1">
   <p:sldMasterIdLst>
-    <p:sldMasterId id="2147483659" r:id="rId4"/>
+    <p:sldMasterId id="2147483659" r:id="rId5"/>
   </p:sldMasterIdLst>
   <p:notesMasterIdLst>
-    <p:notesMasterId r:id="rId5"/>
+    <p:notesMasterId r:id="rId6"/>
   </p:notesMasterIdLst>
   <p:sldIdLst>
-    <p:sldId id="256" r:id="rId6"/>
-    <p:sldId id="257" r:id="rId7"/>
-    <p:sldId id="258" r:id="rId8"/>
-    <p:sldId id="259" r:id="rId9"/>
-    <p:sldId id="260" r:id="rId10"/>
-    <p:sldId id="261" r:id="rId11"/>
+    <p:sldId id="256" r:id="rId7"/>
+    <p:sldId id="257" r:id="rId8"/>
+    <p:sldId id="258" r:id="rId9"/>
+    <p:sldId id="259" r:id="rId10"/>
+    <p:sldId id="260" r:id="rId11"/>
+    <p:sldId id="261" r:id="rId12"/>
+    <p:sldId id="262" r:id="rId13"/>
+    <p:sldId id="263" r:id="rId14"/>
+    <p:sldId id="264" r:id="rId15"/>
+    <p:sldId id="265" r:id="rId16"/>
+    <p:sldId id="266" r:id="rId17"/>
+    <p:sldId id="267" r:id="rId18"/>
   </p:sldIdLst>
   <p:sldSz cy="5143500" cx="9144000"/>
   <p:notesSz cx="6858000" cy="9144000"/>
   <p:embeddedFontLst>
     <p:embeddedFont>
       <p:font typeface="Roboto"/>
-      <p:regular r:id="rId12"/>
-      <p:bold r:id="rId13"/>
-      <p:italic r:id="rId14"/>
-      <p:boldItalic r:id="rId15"/>
+      <p:regular r:id="rId19"/>
+      <p:bold r:id="rId20"/>
+      <p:italic r:id="rId21"/>
+      <p:boldItalic r:id="rId22"/>
     </p:embeddedFont>
   </p:embeddedFontLst>
   <p:defaultTextStyle>
@@ -272,6 +278,66 @@
     </p:ext>
   </p:extLst>
 </p:presentation>
+</file>
+
+<file path=ppt/commentAuthors.xml><?xml version="1.0" encoding="utf-8"?>
+<p:cmAuthorLst xmlns:a="http://schemas.openxmlformats.org/drawingml/2006/main" xmlns:r="http://schemas.openxmlformats.org/officeDocument/2006/relationships" xmlns:mc="http://schemas.openxmlformats.org/markup-compatibility/2006" xmlns:mv="urn:schemas-microsoft-com:mac:vml" xmlns:p="http://schemas.openxmlformats.org/presentationml/2006/main" xmlns:c="http://schemas.openxmlformats.org/drawingml/2006/chart" xmlns:dgm="http://schemas.openxmlformats.org/drawingml/2006/diagram" xmlns:o="urn:schemas-microsoft-com:office:office" xmlns:v="urn:schemas-microsoft-com:vml" xmlns:pvml="urn:schemas-microsoft-com:office:powerpoint" xmlns:com="http://schemas.openxmlformats.org/drawingml/2006/compatibility" xmlns:p14="http://schemas.microsoft.com/office/powerpoint/2010/main" xmlns:p15="http://schemas.microsoft.com/office/powerpoint/2012/main" xmlns:ahyp="http://schemas.microsoft.com/office/drawing/2018/hyperlinkcolor">
+  <p:cmAuthor clrIdx="0" id="0" initials="" lastIdx="6" name="Max R"/>
+</p:cmAuthorLst>
+</file>
+
+<file path=ppt/comments/comment1.xml><?xml version="1.0" encoding="utf-8"?>
+<p:cmLst xmlns:a="http://schemas.openxmlformats.org/drawingml/2006/main" xmlns:r="http://schemas.openxmlformats.org/officeDocument/2006/relationships" xmlns:mc="http://schemas.openxmlformats.org/markup-compatibility/2006" xmlns:mv="urn:schemas-microsoft-com:mac:vml" xmlns:p="http://schemas.openxmlformats.org/presentationml/2006/main" xmlns:c="http://schemas.openxmlformats.org/drawingml/2006/chart" xmlns:dgm="http://schemas.openxmlformats.org/drawingml/2006/diagram" xmlns:o="urn:schemas-microsoft-com:office:office" xmlns:v="urn:schemas-microsoft-com:vml" xmlns:pvml="urn:schemas-microsoft-com:office:powerpoint" xmlns:com="http://schemas.openxmlformats.org/drawingml/2006/compatibility" xmlns:p14="http://schemas.microsoft.com/office/powerpoint/2010/main" xmlns:p15="http://schemas.microsoft.com/office/powerpoint/2012/main" xmlns:ahyp="http://schemas.microsoft.com/office/drawing/2018/hyperlinkcolor">
+  <p:cm authorId="0" idx="1" dt="2023-03-22T00:32:30.640">
+    <p:pos x="6000" y="0"/>
+    <p:text>Will have some visualization included on the slide</p:text>
+  </p:cm>
+</p:cmLst>
+</file>
+
+<file path=ppt/comments/comment2.xml><?xml version="1.0" encoding="utf-8"?>
+<p:cmLst xmlns:a="http://schemas.openxmlformats.org/drawingml/2006/main" xmlns:r="http://schemas.openxmlformats.org/officeDocument/2006/relationships" xmlns:mc="http://schemas.openxmlformats.org/markup-compatibility/2006" xmlns:mv="urn:schemas-microsoft-com:mac:vml" xmlns:p="http://schemas.openxmlformats.org/presentationml/2006/main" xmlns:c="http://schemas.openxmlformats.org/drawingml/2006/chart" xmlns:dgm="http://schemas.openxmlformats.org/drawingml/2006/diagram" xmlns:o="urn:schemas-microsoft-com:office:office" xmlns:v="urn:schemas-microsoft-com:vml" xmlns:pvml="urn:schemas-microsoft-com:office:powerpoint" xmlns:com="http://schemas.openxmlformats.org/drawingml/2006/compatibility" xmlns:p14="http://schemas.microsoft.com/office/powerpoint/2010/main" xmlns:p15="http://schemas.microsoft.com/office/powerpoint/2012/main" xmlns:ahyp="http://schemas.microsoft.com/office/drawing/2018/hyperlinkcolor">
+  <p:cm authorId="0" idx="2" dt="2023-03-22T00:40:12.012">
+    <p:pos x="6000" y="0"/>
+    <p:text>Will be more slides that will all have visualization</p:text>
+  </p:cm>
+</p:cmLst>
+</file>
+
+<file path=ppt/comments/comment3.xml><?xml version="1.0" encoding="utf-8"?>
+<p:cmLst xmlns:a="http://schemas.openxmlformats.org/drawingml/2006/main" xmlns:r="http://schemas.openxmlformats.org/officeDocument/2006/relationships" xmlns:mc="http://schemas.openxmlformats.org/markup-compatibility/2006" xmlns:mv="urn:schemas-microsoft-com:mac:vml" xmlns:p="http://schemas.openxmlformats.org/presentationml/2006/main" xmlns:c="http://schemas.openxmlformats.org/drawingml/2006/chart" xmlns:dgm="http://schemas.openxmlformats.org/drawingml/2006/diagram" xmlns:o="urn:schemas-microsoft-com:office:office" xmlns:v="urn:schemas-microsoft-com:vml" xmlns:pvml="urn:schemas-microsoft-com:office:powerpoint" xmlns:com="http://schemas.openxmlformats.org/drawingml/2006/compatibility" xmlns:p14="http://schemas.microsoft.com/office/powerpoint/2010/main" xmlns:p15="http://schemas.microsoft.com/office/powerpoint/2012/main" xmlns:ahyp="http://schemas.microsoft.com/office/drawing/2018/hyperlinkcolor">
+  <p:cm authorId="0" idx="3" dt="2023-03-22T00:41:34.410">
+    <p:pos x="6000" y="0"/>
+    <p:text>Basic overview of Python and the libraries used</p:text>
+  </p:cm>
+</p:cmLst>
+</file>
+
+<file path=ppt/comments/comment4.xml><?xml version="1.0" encoding="utf-8"?>
+<p:cmLst xmlns:a="http://schemas.openxmlformats.org/drawingml/2006/main" xmlns:r="http://schemas.openxmlformats.org/officeDocument/2006/relationships" xmlns:mc="http://schemas.openxmlformats.org/markup-compatibility/2006" xmlns:mv="urn:schemas-microsoft-com:mac:vml" xmlns:p="http://schemas.openxmlformats.org/presentationml/2006/main" xmlns:c="http://schemas.openxmlformats.org/drawingml/2006/chart" xmlns:dgm="http://schemas.openxmlformats.org/drawingml/2006/diagram" xmlns:o="urn:schemas-microsoft-com:office:office" xmlns:v="urn:schemas-microsoft-com:vml" xmlns:pvml="urn:schemas-microsoft-com:office:powerpoint" xmlns:com="http://schemas.openxmlformats.org/drawingml/2006/compatibility" xmlns:p14="http://schemas.microsoft.com/office/powerpoint/2010/main" xmlns:p15="http://schemas.microsoft.com/office/powerpoint/2012/main" xmlns:ahyp="http://schemas.microsoft.com/office/drawing/2018/hyperlinkcolor">
+  <p:cm authorId="0" idx="4" dt="2023-03-22T00:42:19.919">
+    <p:pos x="6000" y="0"/>
+    <p:text>Machine Learning breakdown</p:text>
+  </p:cm>
+</p:cmLst>
+</file>
+
+<file path=ppt/comments/comment5.xml><?xml version="1.0" encoding="utf-8"?>
+<p:cmLst xmlns:a="http://schemas.openxmlformats.org/drawingml/2006/main" xmlns:r="http://schemas.openxmlformats.org/officeDocument/2006/relationships" xmlns:mc="http://schemas.openxmlformats.org/markup-compatibility/2006" xmlns:mv="urn:schemas-microsoft-com:mac:vml" xmlns:p="http://schemas.openxmlformats.org/presentationml/2006/main" xmlns:c="http://schemas.openxmlformats.org/drawingml/2006/chart" xmlns:dgm="http://schemas.openxmlformats.org/drawingml/2006/diagram" xmlns:o="urn:schemas-microsoft-com:office:office" xmlns:v="urn:schemas-microsoft-com:vml" xmlns:pvml="urn:schemas-microsoft-com:office:powerpoint" xmlns:com="http://schemas.openxmlformats.org/drawingml/2006/compatibility" xmlns:p14="http://schemas.microsoft.com/office/powerpoint/2010/main" xmlns:p15="http://schemas.microsoft.com/office/powerpoint/2012/main" xmlns:ahyp="http://schemas.microsoft.com/office/drawing/2018/hyperlinkcolor">
+  <p:cm authorId="0" idx="5" dt="2023-03-22T00:49:15.446">
+    <p:pos x="6000" y="0"/>
+    <p:text>Multiple visualizations/Dashboard overview</p:text>
+  </p:cm>
+</p:cmLst>
+</file>
+
+<file path=ppt/comments/comment6.xml><?xml version="1.0" encoding="utf-8"?>
+<p:cmLst xmlns:a="http://schemas.openxmlformats.org/drawingml/2006/main" xmlns:r="http://schemas.openxmlformats.org/officeDocument/2006/relationships" xmlns:mc="http://schemas.openxmlformats.org/markup-compatibility/2006" xmlns:mv="urn:schemas-microsoft-com:mac:vml" xmlns:p="http://schemas.openxmlformats.org/presentationml/2006/main" xmlns:c="http://schemas.openxmlformats.org/drawingml/2006/chart" xmlns:dgm="http://schemas.openxmlformats.org/drawingml/2006/diagram" xmlns:o="urn:schemas-microsoft-com:office:office" xmlns:v="urn:schemas-microsoft-com:vml" xmlns:pvml="urn:schemas-microsoft-com:office:powerpoint" xmlns:com="http://schemas.openxmlformats.org/drawingml/2006/compatibility" xmlns:p14="http://schemas.microsoft.com/office/powerpoint/2010/main" xmlns:p15="http://schemas.microsoft.com/office/powerpoint/2012/main" xmlns:ahyp="http://schemas.microsoft.com/office/drawing/2018/hyperlinkcolor">
+  <p:cm authorId="0" idx="6" dt="2023-03-22T00:50:52.995">
+    <p:pos x="6000" y="0"/>
+    <p:text>Question answered? and wrap up</p:text>
+  </p:cm>
+</p:cmLst>
 </file>
 
 <file path=ppt/notesMasters/notesMaster1.xml><?xml version="1.0" encoding="utf-8"?>
@@ -799,6 +865,303 @@
 </p:notes>
 </file>
 
+<file path=ppt/notesSlides/notesSlide10.xml><?xml version="1.0" encoding="utf-8"?>
+<p:notes xmlns:a="http://schemas.openxmlformats.org/drawingml/2006/main" xmlns:r="http://schemas.openxmlformats.org/officeDocument/2006/relationships" xmlns:mc="http://schemas.openxmlformats.org/markup-compatibility/2006" xmlns:mv="urn:schemas-microsoft-com:mac:vml" xmlns:p="http://schemas.openxmlformats.org/presentationml/2006/main" xmlns:c="http://schemas.openxmlformats.org/drawingml/2006/chart" xmlns:dgm="http://schemas.openxmlformats.org/drawingml/2006/diagram" xmlns:o="urn:schemas-microsoft-com:office:office" xmlns:v="urn:schemas-microsoft-com:vml" xmlns:pvml="urn:schemas-microsoft-com:office:powerpoint" xmlns:com="http://schemas.openxmlformats.org/drawingml/2006/compatibility" xmlns:p14="http://schemas.microsoft.com/office/powerpoint/2010/main" xmlns:p15="http://schemas.microsoft.com/office/powerpoint/2012/main" xmlns:ahyp="http://schemas.microsoft.com/office/drawing/2018/hyperlinkcolor" showMasterPhAnim="0" showMasterSp="0">
+  <p:cSld>
+    <p:spTree>
+      <p:nvGrpSpPr>
+        <p:cNvPr id="135" name="Shape 135"/>
+        <p:cNvGrpSpPr/>
+        <p:nvPr/>
+      </p:nvGrpSpPr>
+      <p:grpSpPr>
+        <a:xfrm>
+          <a:off x="0" y="0"/>
+          <a:ext cx="0" cy="0"/>
+          <a:chOff x="0" y="0"/>
+          <a:chExt cx="0" cy="0"/>
+        </a:xfrm>
+      </p:grpSpPr>
+      <p:sp>
+        <p:nvSpPr>
+          <p:cNvPr id="136" name="Google Shape;136;g22237a301a9_0_25:notes"/>
+          <p:cNvSpPr/>
+          <p:nvPr>
+            <p:ph idx="2" type="sldImg"/>
+          </p:nvPr>
+        </p:nvSpPr>
+        <p:spPr>
+          <a:xfrm>
+            <a:off x="381300" y="685800"/>
+            <a:ext cx="6096000" cy="3429000"/>
+          </a:xfrm>
+          <a:custGeom>
+            <a:rect b="b" l="l" r="r" t="t"/>
+            <a:pathLst>
+              <a:path extrusionOk="0" h="120000" w="120000">
+                <a:moveTo>
+                  <a:pt x="0" y="0"/>
+                </a:moveTo>
+                <a:lnTo>
+                  <a:pt x="120000" y="0"/>
+                </a:lnTo>
+                <a:lnTo>
+                  <a:pt x="120000" y="120000"/>
+                </a:lnTo>
+                <a:lnTo>
+                  <a:pt x="0" y="120000"/>
+                </a:lnTo>
+                <a:close/>
+              </a:path>
+            </a:pathLst>
+          </a:custGeom>
+        </p:spPr>
+      </p:sp>
+      <p:sp>
+        <p:nvSpPr>
+          <p:cNvPr id="137" name="Google Shape;137;g22237a301a9_0_25:notes"/>
+          <p:cNvSpPr txBox="1"/>
+          <p:nvPr>
+            <p:ph idx="1" type="body"/>
+          </p:nvPr>
+        </p:nvSpPr>
+        <p:spPr>
+          <a:xfrm>
+            <a:off x="685800" y="4343400"/>
+            <a:ext cx="5486400" cy="4114800"/>
+          </a:xfrm>
+          <a:prstGeom prst="rect">
+            <a:avLst/>
+          </a:prstGeom>
+        </p:spPr>
+        <p:txBody>
+          <a:bodyPr anchorCtr="0" anchor="t" bIns="91425" lIns="91425" spcFirstLastPara="1" rIns="91425" wrap="square" tIns="91425">
+            <a:noAutofit/>
+          </a:bodyPr>
+          <a:lstStyle/>
+          <a:p>
+            <a:pPr indent="0" lvl="0" marL="0" rtl="0" algn="l">
+              <a:spcBef>
+                <a:spcPts val="0"/>
+              </a:spcBef>
+              <a:spcAft>
+                <a:spcPts val="0"/>
+              </a:spcAft>
+              <a:buNone/>
+            </a:pPr>
+            <a:r>
+              <a:t/>
+            </a:r>
+            <a:endParaRPr/>
+          </a:p>
+        </p:txBody>
+      </p:sp>
+    </p:spTree>
+  </p:cSld>
+  <p:clrMapOvr>
+    <a:masterClrMapping/>
+  </p:clrMapOvr>
+</p:notes>
+</file>
+
+<file path=ppt/notesSlides/notesSlide11.xml><?xml version="1.0" encoding="utf-8"?>
+<p:notes xmlns:a="http://schemas.openxmlformats.org/drawingml/2006/main" xmlns:r="http://schemas.openxmlformats.org/officeDocument/2006/relationships" xmlns:mc="http://schemas.openxmlformats.org/markup-compatibility/2006" xmlns:mv="urn:schemas-microsoft-com:mac:vml" xmlns:p="http://schemas.openxmlformats.org/presentationml/2006/main" xmlns:c="http://schemas.openxmlformats.org/drawingml/2006/chart" xmlns:dgm="http://schemas.openxmlformats.org/drawingml/2006/diagram" xmlns:o="urn:schemas-microsoft-com:office:office" xmlns:v="urn:schemas-microsoft-com:vml" xmlns:pvml="urn:schemas-microsoft-com:office:powerpoint" xmlns:com="http://schemas.openxmlformats.org/drawingml/2006/compatibility" xmlns:p14="http://schemas.microsoft.com/office/powerpoint/2010/main" xmlns:p15="http://schemas.microsoft.com/office/powerpoint/2012/main" xmlns:ahyp="http://schemas.microsoft.com/office/drawing/2018/hyperlinkcolor" showMasterPhAnim="0" showMasterSp="0">
+  <p:cSld>
+    <p:spTree>
+      <p:nvGrpSpPr>
+        <p:cNvPr id="141" name="Shape 141"/>
+        <p:cNvGrpSpPr/>
+        <p:nvPr/>
+      </p:nvGrpSpPr>
+      <p:grpSpPr>
+        <a:xfrm>
+          <a:off x="0" y="0"/>
+          <a:ext cx="0" cy="0"/>
+          <a:chOff x="0" y="0"/>
+          <a:chExt cx="0" cy="0"/>
+        </a:xfrm>
+      </p:grpSpPr>
+      <p:sp>
+        <p:nvSpPr>
+          <p:cNvPr id="142" name="Google Shape;142;g22237a301a9_0_15:notes"/>
+          <p:cNvSpPr/>
+          <p:nvPr>
+            <p:ph idx="2" type="sldImg"/>
+          </p:nvPr>
+        </p:nvSpPr>
+        <p:spPr>
+          <a:xfrm>
+            <a:off x="381300" y="685800"/>
+            <a:ext cx="6096000" cy="3429000"/>
+          </a:xfrm>
+          <a:custGeom>
+            <a:rect b="b" l="l" r="r" t="t"/>
+            <a:pathLst>
+              <a:path extrusionOk="0" h="120000" w="120000">
+                <a:moveTo>
+                  <a:pt x="0" y="0"/>
+                </a:moveTo>
+                <a:lnTo>
+                  <a:pt x="120000" y="0"/>
+                </a:lnTo>
+                <a:lnTo>
+                  <a:pt x="120000" y="120000"/>
+                </a:lnTo>
+                <a:lnTo>
+                  <a:pt x="0" y="120000"/>
+                </a:lnTo>
+                <a:close/>
+              </a:path>
+            </a:pathLst>
+          </a:custGeom>
+        </p:spPr>
+      </p:sp>
+      <p:sp>
+        <p:nvSpPr>
+          <p:cNvPr id="143" name="Google Shape;143;g22237a301a9_0_15:notes"/>
+          <p:cNvSpPr txBox="1"/>
+          <p:nvPr>
+            <p:ph idx="1" type="body"/>
+          </p:nvPr>
+        </p:nvSpPr>
+        <p:spPr>
+          <a:xfrm>
+            <a:off x="685800" y="4343400"/>
+            <a:ext cx="5486400" cy="4114800"/>
+          </a:xfrm>
+          <a:prstGeom prst="rect">
+            <a:avLst/>
+          </a:prstGeom>
+        </p:spPr>
+        <p:txBody>
+          <a:bodyPr anchorCtr="0" anchor="t" bIns="91425" lIns="91425" spcFirstLastPara="1" rIns="91425" wrap="square" tIns="91425">
+            <a:noAutofit/>
+          </a:bodyPr>
+          <a:lstStyle/>
+          <a:p>
+            <a:pPr indent="0" lvl="0" marL="0" rtl="0" algn="l">
+              <a:spcBef>
+                <a:spcPts val="0"/>
+              </a:spcBef>
+              <a:spcAft>
+                <a:spcPts val="0"/>
+              </a:spcAft>
+              <a:buNone/>
+            </a:pPr>
+            <a:r>
+              <a:t/>
+            </a:r>
+            <a:endParaRPr/>
+          </a:p>
+        </p:txBody>
+      </p:sp>
+    </p:spTree>
+  </p:cSld>
+  <p:clrMapOvr>
+    <a:masterClrMapping/>
+  </p:clrMapOvr>
+</p:notes>
+</file>
+
+<file path=ppt/notesSlides/notesSlide12.xml><?xml version="1.0" encoding="utf-8"?>
+<p:notes xmlns:a="http://schemas.openxmlformats.org/drawingml/2006/main" xmlns:r="http://schemas.openxmlformats.org/officeDocument/2006/relationships" xmlns:mc="http://schemas.openxmlformats.org/markup-compatibility/2006" xmlns:mv="urn:schemas-microsoft-com:mac:vml" xmlns:p="http://schemas.openxmlformats.org/presentationml/2006/main" xmlns:c="http://schemas.openxmlformats.org/drawingml/2006/chart" xmlns:dgm="http://schemas.openxmlformats.org/drawingml/2006/diagram" xmlns:o="urn:schemas-microsoft-com:office:office" xmlns:v="urn:schemas-microsoft-com:vml" xmlns:pvml="urn:schemas-microsoft-com:office:powerpoint" xmlns:com="http://schemas.openxmlformats.org/drawingml/2006/compatibility" xmlns:p14="http://schemas.microsoft.com/office/powerpoint/2010/main" xmlns:p15="http://schemas.microsoft.com/office/powerpoint/2012/main" xmlns:ahyp="http://schemas.microsoft.com/office/drawing/2018/hyperlinkcolor" showMasterPhAnim="0" showMasterSp="0">
+  <p:cSld>
+    <p:spTree>
+      <p:nvGrpSpPr>
+        <p:cNvPr id="147" name="Shape 147"/>
+        <p:cNvGrpSpPr/>
+        <p:nvPr/>
+      </p:nvGrpSpPr>
+      <p:grpSpPr>
+        <a:xfrm>
+          <a:off x="0" y="0"/>
+          <a:ext cx="0" cy="0"/>
+          <a:chOff x="0" y="0"/>
+          <a:chExt cx="0" cy="0"/>
+        </a:xfrm>
+      </p:grpSpPr>
+      <p:sp>
+        <p:nvSpPr>
+          <p:cNvPr id="148" name="Google Shape;148;g22237a301a9_0_20:notes"/>
+          <p:cNvSpPr/>
+          <p:nvPr>
+            <p:ph idx="2" type="sldImg"/>
+          </p:nvPr>
+        </p:nvSpPr>
+        <p:spPr>
+          <a:xfrm>
+            <a:off x="381300" y="685800"/>
+            <a:ext cx="6096000" cy="3429000"/>
+          </a:xfrm>
+          <a:custGeom>
+            <a:rect b="b" l="l" r="r" t="t"/>
+            <a:pathLst>
+              <a:path extrusionOk="0" h="120000" w="120000">
+                <a:moveTo>
+                  <a:pt x="0" y="0"/>
+                </a:moveTo>
+                <a:lnTo>
+                  <a:pt x="120000" y="0"/>
+                </a:lnTo>
+                <a:lnTo>
+                  <a:pt x="120000" y="120000"/>
+                </a:lnTo>
+                <a:lnTo>
+                  <a:pt x="0" y="120000"/>
+                </a:lnTo>
+                <a:close/>
+              </a:path>
+            </a:pathLst>
+          </a:custGeom>
+        </p:spPr>
+      </p:sp>
+      <p:sp>
+        <p:nvSpPr>
+          <p:cNvPr id="149" name="Google Shape;149;g22237a301a9_0_20:notes"/>
+          <p:cNvSpPr txBox="1"/>
+          <p:nvPr>
+            <p:ph idx="1" type="body"/>
+          </p:nvPr>
+        </p:nvSpPr>
+        <p:spPr>
+          <a:xfrm>
+            <a:off x="685800" y="4343400"/>
+            <a:ext cx="5486400" cy="4114800"/>
+          </a:xfrm>
+          <a:prstGeom prst="rect">
+            <a:avLst/>
+          </a:prstGeom>
+        </p:spPr>
+        <p:txBody>
+          <a:bodyPr anchorCtr="0" anchor="t" bIns="91425" lIns="91425" spcFirstLastPara="1" rIns="91425" wrap="square" tIns="91425">
+            <a:noAutofit/>
+          </a:bodyPr>
+          <a:lstStyle/>
+          <a:p>
+            <a:pPr indent="0" lvl="0" marL="0" rtl="0" algn="l">
+              <a:spcBef>
+                <a:spcPts val="0"/>
+              </a:spcBef>
+              <a:spcAft>
+                <a:spcPts val="0"/>
+              </a:spcAft>
+              <a:buNone/>
+            </a:pPr>
+            <a:r>
+              <a:t/>
+            </a:r>
+            <a:endParaRPr/>
+          </a:p>
+        </p:txBody>
+      </p:sp>
+    </p:spTree>
+  </p:cSld>
+  <p:clrMapOvr>
+    <a:masterClrMapping/>
+  </p:clrMapOvr>
+</p:notes>
+</file>
+
 <file path=ppt/notesSlides/notesSlide2.xml><?xml version="1.0" encoding="utf-8"?>
 <p:notes xmlns:a="http://schemas.openxmlformats.org/drawingml/2006/main" xmlns:r="http://schemas.openxmlformats.org/officeDocument/2006/relationships" xmlns:mc="http://schemas.openxmlformats.org/markup-compatibility/2006" xmlns:mv="urn:schemas-microsoft-com:mac:vml" xmlns:p="http://schemas.openxmlformats.org/presentationml/2006/main" xmlns:c="http://schemas.openxmlformats.org/drawingml/2006/chart" xmlns:dgm="http://schemas.openxmlformats.org/drawingml/2006/diagram" xmlns:o="urn:schemas-microsoft-com:office:office" xmlns:v="urn:schemas-microsoft-com:vml" xmlns:pvml="urn:schemas-microsoft-com:office:powerpoint" xmlns:com="http://schemas.openxmlformats.org/drawingml/2006/compatibility" xmlns:p14="http://schemas.microsoft.com/office/powerpoint/2010/main" xmlns:p15="http://schemas.microsoft.com/office/powerpoint/2012/main" xmlns:ahyp="http://schemas.microsoft.com/office/drawing/2018/hyperlinkcolor" showMasterPhAnim="0" showMasterSp="0">
   <p:cSld>
@@ -1250,6 +1613,303 @@
       <p:sp>
         <p:nvSpPr>
           <p:cNvPr id="113" name="Google Shape;113;g21e7f5a8eb1_1_11:notes"/>
+          <p:cNvSpPr txBox="1"/>
+          <p:nvPr>
+            <p:ph idx="1" type="body"/>
+          </p:nvPr>
+        </p:nvSpPr>
+        <p:spPr>
+          <a:xfrm>
+            <a:off x="685800" y="4343400"/>
+            <a:ext cx="5486400" cy="4114800"/>
+          </a:xfrm>
+          <a:prstGeom prst="rect">
+            <a:avLst/>
+          </a:prstGeom>
+        </p:spPr>
+        <p:txBody>
+          <a:bodyPr anchorCtr="0" anchor="t" bIns="91425" lIns="91425" spcFirstLastPara="1" rIns="91425" wrap="square" tIns="91425">
+            <a:noAutofit/>
+          </a:bodyPr>
+          <a:lstStyle/>
+          <a:p>
+            <a:pPr indent="0" lvl="0" marL="0" rtl="0" algn="l">
+              <a:spcBef>
+                <a:spcPts val="0"/>
+              </a:spcBef>
+              <a:spcAft>
+                <a:spcPts val="0"/>
+              </a:spcAft>
+              <a:buNone/>
+            </a:pPr>
+            <a:r>
+              <a:t/>
+            </a:r>
+            <a:endParaRPr/>
+          </a:p>
+        </p:txBody>
+      </p:sp>
+    </p:spTree>
+  </p:cSld>
+  <p:clrMapOvr>
+    <a:masterClrMapping/>
+  </p:clrMapOvr>
+</p:notes>
+</file>
+
+<file path=ppt/notesSlides/notesSlide7.xml><?xml version="1.0" encoding="utf-8"?>
+<p:notes xmlns:a="http://schemas.openxmlformats.org/drawingml/2006/main" xmlns:r="http://schemas.openxmlformats.org/officeDocument/2006/relationships" xmlns:mc="http://schemas.openxmlformats.org/markup-compatibility/2006" xmlns:mv="urn:schemas-microsoft-com:mac:vml" xmlns:p="http://schemas.openxmlformats.org/presentationml/2006/main" xmlns:c="http://schemas.openxmlformats.org/drawingml/2006/chart" xmlns:dgm="http://schemas.openxmlformats.org/drawingml/2006/diagram" xmlns:o="urn:schemas-microsoft-com:office:office" xmlns:v="urn:schemas-microsoft-com:vml" xmlns:pvml="urn:schemas-microsoft-com:office:powerpoint" xmlns:com="http://schemas.openxmlformats.org/drawingml/2006/compatibility" xmlns:p14="http://schemas.microsoft.com/office/powerpoint/2010/main" xmlns:p15="http://schemas.microsoft.com/office/powerpoint/2012/main" xmlns:ahyp="http://schemas.microsoft.com/office/drawing/2018/hyperlinkcolor" showMasterPhAnim="0" showMasterSp="0">
+  <p:cSld>
+    <p:spTree>
+      <p:nvGrpSpPr>
+        <p:cNvPr id="117" name="Shape 117"/>
+        <p:cNvGrpSpPr/>
+        <p:nvPr/>
+      </p:nvGrpSpPr>
+      <p:grpSpPr>
+        <a:xfrm>
+          <a:off x="0" y="0"/>
+          <a:ext cx="0" cy="0"/>
+          <a:chOff x="0" y="0"/>
+          <a:chExt cx="0" cy="0"/>
+        </a:xfrm>
+      </p:grpSpPr>
+      <p:sp>
+        <p:nvSpPr>
+          <p:cNvPr id="118" name="Google Shape;118;g22237a301a9_0_5:notes"/>
+          <p:cNvSpPr/>
+          <p:nvPr>
+            <p:ph idx="2" type="sldImg"/>
+          </p:nvPr>
+        </p:nvSpPr>
+        <p:spPr>
+          <a:xfrm>
+            <a:off x="381300" y="685800"/>
+            <a:ext cx="6096000" cy="3429000"/>
+          </a:xfrm>
+          <a:custGeom>
+            <a:rect b="b" l="l" r="r" t="t"/>
+            <a:pathLst>
+              <a:path extrusionOk="0" h="120000" w="120000">
+                <a:moveTo>
+                  <a:pt x="0" y="0"/>
+                </a:moveTo>
+                <a:lnTo>
+                  <a:pt x="120000" y="0"/>
+                </a:lnTo>
+                <a:lnTo>
+                  <a:pt x="120000" y="120000"/>
+                </a:lnTo>
+                <a:lnTo>
+                  <a:pt x="0" y="120000"/>
+                </a:lnTo>
+                <a:close/>
+              </a:path>
+            </a:pathLst>
+          </a:custGeom>
+        </p:spPr>
+      </p:sp>
+      <p:sp>
+        <p:nvSpPr>
+          <p:cNvPr id="119" name="Google Shape;119;g22237a301a9_0_5:notes"/>
+          <p:cNvSpPr txBox="1"/>
+          <p:nvPr>
+            <p:ph idx="1" type="body"/>
+          </p:nvPr>
+        </p:nvSpPr>
+        <p:spPr>
+          <a:xfrm>
+            <a:off x="685800" y="4343400"/>
+            <a:ext cx="5486400" cy="4114800"/>
+          </a:xfrm>
+          <a:prstGeom prst="rect">
+            <a:avLst/>
+          </a:prstGeom>
+        </p:spPr>
+        <p:txBody>
+          <a:bodyPr anchorCtr="0" anchor="t" bIns="91425" lIns="91425" spcFirstLastPara="1" rIns="91425" wrap="square" tIns="91425">
+            <a:noAutofit/>
+          </a:bodyPr>
+          <a:lstStyle/>
+          <a:p>
+            <a:pPr indent="0" lvl="0" marL="0" rtl="0" algn="l">
+              <a:spcBef>
+                <a:spcPts val="0"/>
+              </a:spcBef>
+              <a:spcAft>
+                <a:spcPts val="0"/>
+              </a:spcAft>
+              <a:buNone/>
+            </a:pPr>
+            <a:r>
+              <a:t/>
+            </a:r>
+            <a:endParaRPr/>
+          </a:p>
+        </p:txBody>
+      </p:sp>
+    </p:spTree>
+  </p:cSld>
+  <p:clrMapOvr>
+    <a:masterClrMapping/>
+  </p:clrMapOvr>
+</p:notes>
+</file>
+
+<file path=ppt/notesSlides/notesSlide8.xml><?xml version="1.0" encoding="utf-8"?>
+<p:notes xmlns:a="http://schemas.openxmlformats.org/drawingml/2006/main" xmlns:r="http://schemas.openxmlformats.org/officeDocument/2006/relationships" xmlns:mc="http://schemas.openxmlformats.org/markup-compatibility/2006" xmlns:mv="urn:schemas-microsoft-com:mac:vml" xmlns:p="http://schemas.openxmlformats.org/presentationml/2006/main" xmlns:c="http://schemas.openxmlformats.org/drawingml/2006/chart" xmlns:dgm="http://schemas.openxmlformats.org/drawingml/2006/diagram" xmlns:o="urn:schemas-microsoft-com:office:office" xmlns:v="urn:schemas-microsoft-com:vml" xmlns:pvml="urn:schemas-microsoft-com:office:powerpoint" xmlns:com="http://schemas.openxmlformats.org/drawingml/2006/compatibility" xmlns:p14="http://schemas.microsoft.com/office/powerpoint/2010/main" xmlns:p15="http://schemas.microsoft.com/office/powerpoint/2012/main" xmlns:ahyp="http://schemas.microsoft.com/office/drawing/2018/hyperlinkcolor" showMasterPhAnim="0" showMasterSp="0">
+  <p:cSld>
+    <p:spTree>
+      <p:nvGrpSpPr>
+        <p:cNvPr id="123" name="Shape 123"/>
+        <p:cNvGrpSpPr/>
+        <p:nvPr/>
+      </p:nvGrpSpPr>
+      <p:grpSpPr>
+        <a:xfrm>
+          <a:off x="0" y="0"/>
+          <a:ext cx="0" cy="0"/>
+          <a:chOff x="0" y="0"/>
+          <a:chExt cx="0" cy="0"/>
+        </a:xfrm>
+      </p:grpSpPr>
+      <p:sp>
+        <p:nvSpPr>
+          <p:cNvPr id="124" name="Google Shape;124;g22237a301a9_0_0:notes"/>
+          <p:cNvSpPr/>
+          <p:nvPr>
+            <p:ph idx="2" type="sldImg"/>
+          </p:nvPr>
+        </p:nvSpPr>
+        <p:spPr>
+          <a:xfrm>
+            <a:off x="381300" y="685800"/>
+            <a:ext cx="6096000" cy="3429000"/>
+          </a:xfrm>
+          <a:custGeom>
+            <a:rect b="b" l="l" r="r" t="t"/>
+            <a:pathLst>
+              <a:path extrusionOk="0" h="120000" w="120000">
+                <a:moveTo>
+                  <a:pt x="0" y="0"/>
+                </a:moveTo>
+                <a:lnTo>
+                  <a:pt x="120000" y="0"/>
+                </a:lnTo>
+                <a:lnTo>
+                  <a:pt x="120000" y="120000"/>
+                </a:lnTo>
+                <a:lnTo>
+                  <a:pt x="0" y="120000"/>
+                </a:lnTo>
+                <a:close/>
+              </a:path>
+            </a:pathLst>
+          </a:custGeom>
+        </p:spPr>
+      </p:sp>
+      <p:sp>
+        <p:nvSpPr>
+          <p:cNvPr id="125" name="Google Shape;125;g22237a301a9_0_0:notes"/>
+          <p:cNvSpPr txBox="1"/>
+          <p:nvPr>
+            <p:ph idx="1" type="body"/>
+          </p:nvPr>
+        </p:nvSpPr>
+        <p:spPr>
+          <a:xfrm>
+            <a:off x="685800" y="4343400"/>
+            <a:ext cx="5486400" cy="4114800"/>
+          </a:xfrm>
+          <a:prstGeom prst="rect">
+            <a:avLst/>
+          </a:prstGeom>
+        </p:spPr>
+        <p:txBody>
+          <a:bodyPr anchorCtr="0" anchor="t" bIns="91425" lIns="91425" spcFirstLastPara="1" rIns="91425" wrap="square" tIns="91425">
+            <a:noAutofit/>
+          </a:bodyPr>
+          <a:lstStyle/>
+          <a:p>
+            <a:pPr indent="0" lvl="0" marL="0" rtl="0" algn="l">
+              <a:spcBef>
+                <a:spcPts val="0"/>
+              </a:spcBef>
+              <a:spcAft>
+                <a:spcPts val="0"/>
+              </a:spcAft>
+              <a:buNone/>
+            </a:pPr>
+            <a:r>
+              <a:t/>
+            </a:r>
+            <a:endParaRPr/>
+          </a:p>
+        </p:txBody>
+      </p:sp>
+    </p:spTree>
+  </p:cSld>
+  <p:clrMapOvr>
+    <a:masterClrMapping/>
+  </p:clrMapOvr>
+</p:notes>
+</file>
+
+<file path=ppt/notesSlides/notesSlide9.xml><?xml version="1.0" encoding="utf-8"?>
+<p:notes xmlns:a="http://schemas.openxmlformats.org/drawingml/2006/main" xmlns:r="http://schemas.openxmlformats.org/officeDocument/2006/relationships" xmlns:mc="http://schemas.openxmlformats.org/markup-compatibility/2006" xmlns:mv="urn:schemas-microsoft-com:mac:vml" xmlns:p="http://schemas.openxmlformats.org/presentationml/2006/main" xmlns:c="http://schemas.openxmlformats.org/drawingml/2006/chart" xmlns:dgm="http://schemas.openxmlformats.org/drawingml/2006/diagram" xmlns:o="urn:schemas-microsoft-com:office:office" xmlns:v="urn:schemas-microsoft-com:vml" xmlns:pvml="urn:schemas-microsoft-com:office:powerpoint" xmlns:com="http://schemas.openxmlformats.org/drawingml/2006/compatibility" xmlns:p14="http://schemas.microsoft.com/office/powerpoint/2010/main" xmlns:p15="http://schemas.microsoft.com/office/powerpoint/2012/main" xmlns:ahyp="http://schemas.microsoft.com/office/drawing/2018/hyperlinkcolor" showMasterPhAnim="0" showMasterSp="0">
+  <p:cSld>
+    <p:spTree>
+      <p:nvGrpSpPr>
+        <p:cNvPr id="129" name="Shape 129"/>
+        <p:cNvGrpSpPr/>
+        <p:nvPr/>
+      </p:nvGrpSpPr>
+      <p:grpSpPr>
+        <a:xfrm>
+          <a:off x="0" y="0"/>
+          <a:ext cx="0" cy="0"/>
+          <a:chOff x="0" y="0"/>
+          <a:chExt cx="0" cy="0"/>
+        </a:xfrm>
+      </p:grpSpPr>
+      <p:sp>
+        <p:nvSpPr>
+          <p:cNvPr id="130" name="Google Shape;130;g22237a301a9_0_10:notes"/>
+          <p:cNvSpPr/>
+          <p:nvPr>
+            <p:ph idx="2" type="sldImg"/>
+          </p:nvPr>
+        </p:nvSpPr>
+        <p:spPr>
+          <a:xfrm>
+            <a:off x="381300" y="685800"/>
+            <a:ext cx="6096000" cy="3429000"/>
+          </a:xfrm>
+          <a:custGeom>
+            <a:rect b="b" l="l" r="r" t="t"/>
+            <a:pathLst>
+              <a:path extrusionOk="0" h="120000" w="120000">
+                <a:moveTo>
+                  <a:pt x="0" y="0"/>
+                </a:moveTo>
+                <a:lnTo>
+                  <a:pt x="120000" y="0"/>
+                </a:lnTo>
+                <a:lnTo>
+                  <a:pt x="120000" y="120000"/>
+                </a:lnTo>
+                <a:lnTo>
+                  <a:pt x="0" y="120000"/>
+                </a:lnTo>
+                <a:close/>
+              </a:path>
+            </a:pathLst>
+          </a:custGeom>
+        </p:spPr>
+      </p:sp>
+      <p:sp>
+        <p:nvSpPr>
+          <p:cNvPr id="131" name="Google Shape;131;g22237a301a9_0_10:notes"/>
           <p:cNvSpPr txBox="1"/>
           <p:nvPr>
             <p:ph idx="1" type="body"/>
@@ -7999,6 +8659,322 @@
 </p:sld>
 </file>
 
+<file path=ppt/slides/slide10.xml><?xml version="1.0" encoding="utf-8"?>
+<p:sld xmlns:a="http://schemas.openxmlformats.org/drawingml/2006/main" xmlns:r="http://schemas.openxmlformats.org/officeDocument/2006/relationships" xmlns:mc="http://schemas.openxmlformats.org/markup-compatibility/2006" xmlns:mv="urn:schemas-microsoft-com:mac:vml" xmlns:p="http://schemas.openxmlformats.org/presentationml/2006/main" xmlns:c="http://schemas.openxmlformats.org/drawingml/2006/chart" xmlns:dgm="http://schemas.openxmlformats.org/drawingml/2006/diagram" xmlns:o="urn:schemas-microsoft-com:office:office" xmlns:v="urn:schemas-microsoft-com:vml" xmlns:pvml="urn:schemas-microsoft-com:office:powerpoint" xmlns:com="http://schemas.openxmlformats.org/drawingml/2006/compatibility" xmlns:p14="http://schemas.microsoft.com/office/powerpoint/2010/main" xmlns:p15="http://schemas.microsoft.com/office/powerpoint/2012/main" xmlns:ahyp="http://schemas.microsoft.com/office/drawing/2018/hyperlinkcolor">
+  <p:cSld>
+    <p:spTree>
+      <p:nvGrpSpPr>
+        <p:cNvPr id="138" name="Shape 138"/>
+        <p:cNvGrpSpPr/>
+        <p:nvPr/>
+      </p:nvGrpSpPr>
+      <p:grpSpPr>
+        <a:xfrm>
+          <a:off x="0" y="0"/>
+          <a:ext cx="0" cy="0"/>
+          <a:chOff x="0" y="0"/>
+          <a:chExt cx="0" cy="0"/>
+        </a:xfrm>
+      </p:grpSpPr>
+      <p:sp>
+        <p:nvSpPr>
+          <p:cNvPr id="139" name="Google Shape;139;p22"/>
+          <p:cNvSpPr txBox="1"/>
+          <p:nvPr>
+            <p:ph type="title"/>
+          </p:nvPr>
+        </p:nvSpPr>
+        <p:spPr>
+          <a:xfrm>
+            <a:off x="311700" y="410000"/>
+            <a:ext cx="8520600" cy="607800"/>
+          </a:xfrm>
+          <a:prstGeom prst="rect">
+            <a:avLst/>
+          </a:prstGeom>
+        </p:spPr>
+        <p:txBody>
+          <a:bodyPr anchorCtr="0" anchor="t" bIns="91425" lIns="91425" spcFirstLastPara="1" rIns="91425" wrap="square" tIns="91425">
+            <a:normAutofit fontScale="90000"/>
+          </a:bodyPr>
+          <a:lstStyle/>
+          <a:p>
+            <a:pPr indent="0" lvl="0" marL="0" rtl="0" algn="l">
+              <a:spcBef>
+                <a:spcPts val="0"/>
+              </a:spcBef>
+              <a:spcAft>
+                <a:spcPts val="0"/>
+              </a:spcAft>
+              <a:buNone/>
+            </a:pPr>
+            <a:r>
+              <a:rPr lang="en"/>
+              <a:t>Main Challenges</a:t>
+            </a:r>
+            <a:endParaRPr/>
+          </a:p>
+        </p:txBody>
+      </p:sp>
+      <p:sp>
+        <p:nvSpPr>
+          <p:cNvPr id="140" name="Google Shape;140;p22"/>
+          <p:cNvSpPr txBox="1"/>
+          <p:nvPr>
+            <p:ph idx="1" type="body"/>
+          </p:nvPr>
+        </p:nvSpPr>
+        <p:spPr>
+          <a:xfrm>
+            <a:off x="311700" y="1229875"/>
+            <a:ext cx="8520600" cy="3339000"/>
+          </a:xfrm>
+          <a:prstGeom prst="rect">
+            <a:avLst/>
+          </a:prstGeom>
+        </p:spPr>
+        <p:txBody>
+          <a:bodyPr anchorCtr="0" anchor="t" bIns="91425" lIns="91425" spcFirstLastPara="1" rIns="91425" wrap="square" tIns="91425">
+            <a:normAutofit/>
+          </a:bodyPr>
+          <a:lstStyle/>
+          <a:p>
+            <a:pPr indent="0" lvl="0" marL="0" rtl="0" algn="l">
+              <a:spcBef>
+                <a:spcPts val="0"/>
+              </a:spcBef>
+              <a:spcAft>
+                <a:spcPts val="1200"/>
+              </a:spcAft>
+              <a:buNone/>
+            </a:pPr>
+            <a:r>
+              <a:t/>
+            </a:r>
+            <a:endParaRPr/>
+          </a:p>
+        </p:txBody>
+      </p:sp>
+    </p:spTree>
+  </p:cSld>
+  <p:clrMapOvr>
+    <a:masterClrMapping/>
+  </p:clrMapOvr>
+</p:sld>
+</file>
+
+<file path=ppt/slides/slide11.xml><?xml version="1.0" encoding="utf-8"?>
+<p:sld xmlns:a="http://schemas.openxmlformats.org/drawingml/2006/main" xmlns:r="http://schemas.openxmlformats.org/officeDocument/2006/relationships" xmlns:mc="http://schemas.openxmlformats.org/markup-compatibility/2006" xmlns:mv="urn:schemas-microsoft-com:mac:vml" xmlns:p="http://schemas.openxmlformats.org/presentationml/2006/main" xmlns:c="http://schemas.openxmlformats.org/drawingml/2006/chart" xmlns:dgm="http://schemas.openxmlformats.org/drawingml/2006/diagram" xmlns:o="urn:schemas-microsoft-com:office:office" xmlns:v="urn:schemas-microsoft-com:vml" xmlns:pvml="urn:schemas-microsoft-com:office:powerpoint" xmlns:com="http://schemas.openxmlformats.org/drawingml/2006/compatibility" xmlns:p14="http://schemas.microsoft.com/office/powerpoint/2010/main" xmlns:p15="http://schemas.microsoft.com/office/powerpoint/2012/main" xmlns:ahyp="http://schemas.microsoft.com/office/drawing/2018/hyperlinkcolor">
+  <p:cSld>
+    <p:spTree>
+      <p:nvGrpSpPr>
+        <p:cNvPr id="144" name="Shape 144"/>
+        <p:cNvGrpSpPr/>
+        <p:nvPr/>
+      </p:nvGrpSpPr>
+      <p:grpSpPr>
+        <a:xfrm>
+          <a:off x="0" y="0"/>
+          <a:ext cx="0" cy="0"/>
+          <a:chOff x="0" y="0"/>
+          <a:chExt cx="0" cy="0"/>
+        </a:xfrm>
+      </p:grpSpPr>
+      <p:sp>
+        <p:nvSpPr>
+          <p:cNvPr id="145" name="Google Shape;145;p23"/>
+          <p:cNvSpPr txBox="1"/>
+          <p:nvPr>
+            <p:ph type="title"/>
+          </p:nvPr>
+        </p:nvSpPr>
+        <p:spPr>
+          <a:xfrm>
+            <a:off x="311700" y="410000"/>
+            <a:ext cx="8520600" cy="607800"/>
+          </a:xfrm>
+          <a:prstGeom prst="rect">
+            <a:avLst/>
+          </a:prstGeom>
+        </p:spPr>
+        <p:txBody>
+          <a:bodyPr anchorCtr="0" anchor="t" bIns="91425" lIns="91425" spcFirstLastPara="1" rIns="91425" wrap="square" tIns="91425">
+            <a:normAutofit fontScale="90000"/>
+          </a:bodyPr>
+          <a:lstStyle/>
+          <a:p>
+            <a:pPr indent="0" lvl="0" marL="0" rtl="0" algn="l">
+              <a:spcBef>
+                <a:spcPts val="0"/>
+              </a:spcBef>
+              <a:spcAft>
+                <a:spcPts val="0"/>
+              </a:spcAft>
+              <a:buNone/>
+            </a:pPr>
+            <a:r>
+              <a:rPr lang="en"/>
+              <a:t>What We Would Do </a:t>
+            </a:r>
+            <a:r>
+              <a:rPr lang="en"/>
+              <a:t>Differently</a:t>
+            </a:r>
+            <a:endParaRPr/>
+          </a:p>
+        </p:txBody>
+      </p:sp>
+      <p:sp>
+        <p:nvSpPr>
+          <p:cNvPr id="146" name="Google Shape;146;p23"/>
+          <p:cNvSpPr txBox="1"/>
+          <p:nvPr>
+            <p:ph idx="1" type="body"/>
+          </p:nvPr>
+        </p:nvSpPr>
+        <p:spPr>
+          <a:xfrm>
+            <a:off x="311700" y="1229875"/>
+            <a:ext cx="8520600" cy="3339000"/>
+          </a:xfrm>
+          <a:prstGeom prst="rect">
+            <a:avLst/>
+          </a:prstGeom>
+        </p:spPr>
+        <p:txBody>
+          <a:bodyPr anchorCtr="0" anchor="t" bIns="91425" lIns="91425" spcFirstLastPara="1" rIns="91425" wrap="square" tIns="91425">
+            <a:normAutofit/>
+          </a:bodyPr>
+          <a:lstStyle/>
+          <a:p>
+            <a:pPr indent="0" lvl="0" marL="0" rtl="0" algn="l">
+              <a:spcBef>
+                <a:spcPts val="0"/>
+              </a:spcBef>
+              <a:spcAft>
+                <a:spcPts val="1200"/>
+              </a:spcAft>
+              <a:buNone/>
+            </a:pPr>
+            <a:r>
+              <a:t/>
+            </a:r>
+            <a:endParaRPr/>
+          </a:p>
+        </p:txBody>
+      </p:sp>
+    </p:spTree>
+  </p:cSld>
+  <p:clrMapOvr>
+    <a:masterClrMapping/>
+  </p:clrMapOvr>
+</p:sld>
+</file>
+
+<file path=ppt/slides/slide12.xml><?xml version="1.0" encoding="utf-8"?>
+<p:sld xmlns:a="http://schemas.openxmlformats.org/drawingml/2006/main" xmlns:r="http://schemas.openxmlformats.org/officeDocument/2006/relationships" xmlns:mc="http://schemas.openxmlformats.org/markup-compatibility/2006" xmlns:mv="urn:schemas-microsoft-com:mac:vml" xmlns:p="http://schemas.openxmlformats.org/presentationml/2006/main" xmlns:c="http://schemas.openxmlformats.org/drawingml/2006/chart" xmlns:dgm="http://schemas.openxmlformats.org/drawingml/2006/diagram" xmlns:o="urn:schemas-microsoft-com:office:office" xmlns:v="urn:schemas-microsoft-com:vml" xmlns:pvml="urn:schemas-microsoft-com:office:powerpoint" xmlns:com="http://schemas.openxmlformats.org/drawingml/2006/compatibility" xmlns:p14="http://schemas.microsoft.com/office/powerpoint/2010/main" xmlns:p15="http://schemas.microsoft.com/office/powerpoint/2012/main" xmlns:ahyp="http://schemas.microsoft.com/office/drawing/2018/hyperlinkcolor">
+  <p:cSld>
+    <p:spTree>
+      <p:nvGrpSpPr>
+        <p:cNvPr id="150" name="Shape 150"/>
+        <p:cNvGrpSpPr/>
+        <p:nvPr/>
+      </p:nvGrpSpPr>
+      <p:grpSpPr>
+        <a:xfrm>
+          <a:off x="0" y="0"/>
+          <a:ext cx="0" cy="0"/>
+          <a:chOff x="0" y="0"/>
+          <a:chExt cx="0" cy="0"/>
+        </a:xfrm>
+      </p:grpSpPr>
+      <p:sp>
+        <p:nvSpPr>
+          <p:cNvPr id="151" name="Google Shape;151;p24"/>
+          <p:cNvSpPr txBox="1"/>
+          <p:nvPr>
+            <p:ph type="title"/>
+          </p:nvPr>
+        </p:nvSpPr>
+        <p:spPr>
+          <a:xfrm>
+            <a:off x="311700" y="410000"/>
+            <a:ext cx="8520600" cy="607800"/>
+          </a:xfrm>
+          <a:prstGeom prst="rect">
+            <a:avLst/>
+          </a:prstGeom>
+        </p:spPr>
+        <p:txBody>
+          <a:bodyPr anchorCtr="0" anchor="t" bIns="91425" lIns="91425" spcFirstLastPara="1" rIns="91425" wrap="square" tIns="91425">
+            <a:normAutofit fontScale="90000"/>
+          </a:bodyPr>
+          <a:lstStyle/>
+          <a:p>
+            <a:pPr indent="0" lvl="0" marL="0" rtl="0" algn="l">
+              <a:spcBef>
+                <a:spcPts val="0"/>
+              </a:spcBef>
+              <a:spcAft>
+                <a:spcPts val="0"/>
+              </a:spcAft>
+              <a:buNone/>
+            </a:pPr>
+            <a:r>
+              <a:rPr lang="en"/>
+              <a:t>Final Findings</a:t>
+            </a:r>
+            <a:endParaRPr/>
+          </a:p>
+        </p:txBody>
+      </p:sp>
+      <p:sp>
+        <p:nvSpPr>
+          <p:cNvPr id="152" name="Google Shape;152;p24"/>
+          <p:cNvSpPr txBox="1"/>
+          <p:nvPr>
+            <p:ph idx="1" type="body"/>
+          </p:nvPr>
+        </p:nvSpPr>
+        <p:spPr>
+          <a:xfrm>
+            <a:off x="311700" y="1229875"/>
+            <a:ext cx="8520600" cy="3339000"/>
+          </a:xfrm>
+          <a:prstGeom prst="rect">
+            <a:avLst/>
+          </a:prstGeom>
+        </p:spPr>
+        <p:txBody>
+          <a:bodyPr anchorCtr="0" anchor="t" bIns="91425" lIns="91425" spcFirstLastPara="1" rIns="91425" wrap="square" tIns="91425">
+            <a:normAutofit/>
+          </a:bodyPr>
+          <a:lstStyle/>
+          <a:p>
+            <a:pPr indent="0" lvl="0" marL="0" rtl="0" algn="l">
+              <a:spcBef>
+                <a:spcPts val="0"/>
+              </a:spcBef>
+              <a:spcAft>
+                <a:spcPts val="1200"/>
+              </a:spcAft>
+              <a:buNone/>
+            </a:pPr>
+            <a:r>
+              <a:t/>
+            </a:r>
+            <a:endParaRPr/>
+          </a:p>
+        </p:txBody>
+      </p:sp>
+    </p:spTree>
+  </p:cSld>
+  <p:clrMapOvr>
+    <a:masterClrMapping/>
+  </p:clrMapOvr>
+</p:sld>
+</file>
+
 <file path=ppt/slides/slide2.xml><?xml version="1.0" encoding="utf-8"?>
 <p:sld xmlns:a="http://schemas.openxmlformats.org/drawingml/2006/main" xmlns:r="http://schemas.openxmlformats.org/officeDocument/2006/relationships" xmlns:mc="http://schemas.openxmlformats.org/markup-compatibility/2006" xmlns:mv="urn:schemas-microsoft-com:mac:vml" xmlns:p="http://schemas.openxmlformats.org/presentationml/2006/main" xmlns:c="http://schemas.openxmlformats.org/drawingml/2006/chart" xmlns:dgm="http://schemas.openxmlformats.org/drawingml/2006/diagram" xmlns:o="urn:schemas-microsoft-com:office:office" xmlns:v="urn:schemas-microsoft-com:vml" xmlns:pvml="urn:schemas-microsoft-com:office:powerpoint" xmlns:com="http://schemas.openxmlformats.org/drawingml/2006/compatibility" xmlns:p14="http://schemas.microsoft.com/office/powerpoint/2010/main" xmlns:p15="http://schemas.microsoft.com/office/powerpoint/2012/main" xmlns:ahyp="http://schemas.microsoft.com/office/drawing/2018/hyperlinkcolor">
   <p:cSld>
@@ -8724,6 +9700,318 @@
               </a:spcAft>
               <a:buSzPts val="1800"/>
               <a:buChar char="●"/>
+            </a:pPr>
+            <a:r>
+              <a:t/>
+            </a:r>
+            <a:endParaRPr/>
+          </a:p>
+        </p:txBody>
+      </p:sp>
+    </p:spTree>
+  </p:cSld>
+  <p:clrMapOvr>
+    <a:masterClrMapping/>
+  </p:clrMapOvr>
+</p:sld>
+</file>
+
+<file path=ppt/slides/slide7.xml><?xml version="1.0" encoding="utf-8"?>
+<p:sld xmlns:a="http://schemas.openxmlformats.org/drawingml/2006/main" xmlns:r="http://schemas.openxmlformats.org/officeDocument/2006/relationships" xmlns:mc="http://schemas.openxmlformats.org/markup-compatibility/2006" xmlns:mv="urn:schemas-microsoft-com:mac:vml" xmlns:p="http://schemas.openxmlformats.org/presentationml/2006/main" xmlns:c="http://schemas.openxmlformats.org/drawingml/2006/chart" xmlns:dgm="http://schemas.openxmlformats.org/drawingml/2006/diagram" xmlns:o="urn:schemas-microsoft-com:office:office" xmlns:v="urn:schemas-microsoft-com:vml" xmlns:pvml="urn:schemas-microsoft-com:office:powerpoint" xmlns:com="http://schemas.openxmlformats.org/drawingml/2006/compatibility" xmlns:p14="http://schemas.microsoft.com/office/powerpoint/2010/main" xmlns:p15="http://schemas.microsoft.com/office/powerpoint/2012/main" xmlns:ahyp="http://schemas.microsoft.com/office/drawing/2018/hyperlinkcolor">
+  <p:cSld>
+    <p:spTree>
+      <p:nvGrpSpPr>
+        <p:cNvPr id="120" name="Shape 120"/>
+        <p:cNvGrpSpPr/>
+        <p:nvPr/>
+      </p:nvGrpSpPr>
+      <p:grpSpPr>
+        <a:xfrm>
+          <a:off x="0" y="0"/>
+          <a:ext cx="0" cy="0"/>
+          <a:chOff x="0" y="0"/>
+          <a:chExt cx="0" cy="0"/>
+        </a:xfrm>
+      </p:grpSpPr>
+      <p:sp>
+        <p:nvSpPr>
+          <p:cNvPr id="121" name="Google Shape;121;p19"/>
+          <p:cNvSpPr txBox="1"/>
+          <p:nvPr>
+            <p:ph type="title"/>
+          </p:nvPr>
+        </p:nvSpPr>
+        <p:spPr>
+          <a:xfrm>
+            <a:off x="311700" y="410000"/>
+            <a:ext cx="8520600" cy="607800"/>
+          </a:xfrm>
+          <a:prstGeom prst="rect">
+            <a:avLst/>
+          </a:prstGeom>
+        </p:spPr>
+        <p:txBody>
+          <a:bodyPr anchorCtr="0" anchor="t" bIns="91425" lIns="91425" spcFirstLastPara="1" rIns="91425" wrap="square" tIns="91425">
+            <a:normAutofit fontScale="90000"/>
+          </a:bodyPr>
+          <a:lstStyle/>
+          <a:p>
+            <a:pPr indent="0" lvl="0" marL="0" rtl="0" algn="l">
+              <a:spcBef>
+                <a:spcPts val="0"/>
+              </a:spcBef>
+              <a:spcAft>
+                <a:spcPts val="0"/>
+              </a:spcAft>
+              <a:buNone/>
+            </a:pPr>
+            <a:r>
+              <a:rPr lang="en"/>
+              <a:t>Languages Used</a:t>
+            </a:r>
+            <a:endParaRPr/>
+          </a:p>
+        </p:txBody>
+      </p:sp>
+      <p:sp>
+        <p:nvSpPr>
+          <p:cNvPr id="122" name="Google Shape;122;p19"/>
+          <p:cNvSpPr txBox="1"/>
+          <p:nvPr>
+            <p:ph idx="1" type="body"/>
+          </p:nvPr>
+        </p:nvSpPr>
+        <p:spPr>
+          <a:xfrm>
+            <a:off x="311700" y="1229875"/>
+            <a:ext cx="8520600" cy="3339000"/>
+          </a:xfrm>
+          <a:prstGeom prst="rect">
+            <a:avLst/>
+          </a:prstGeom>
+        </p:spPr>
+        <p:txBody>
+          <a:bodyPr anchorCtr="0" anchor="t" bIns="91425" lIns="91425" spcFirstLastPara="1" rIns="91425" wrap="square" tIns="91425">
+            <a:normAutofit/>
+          </a:bodyPr>
+          <a:lstStyle/>
+          <a:p>
+            <a:pPr indent="0" lvl="0" marL="0" rtl="0" algn="l">
+              <a:spcBef>
+                <a:spcPts val="0"/>
+              </a:spcBef>
+              <a:spcAft>
+                <a:spcPts val="1200"/>
+              </a:spcAft>
+              <a:buNone/>
+            </a:pPr>
+            <a:r>
+              <a:t/>
+            </a:r>
+            <a:endParaRPr/>
+          </a:p>
+        </p:txBody>
+      </p:sp>
+    </p:spTree>
+  </p:cSld>
+  <p:clrMapOvr>
+    <a:masterClrMapping/>
+  </p:clrMapOvr>
+</p:sld>
+</file>
+
+<file path=ppt/slides/slide8.xml><?xml version="1.0" encoding="utf-8"?>
+<p:sld xmlns:a="http://schemas.openxmlformats.org/drawingml/2006/main" xmlns:r="http://schemas.openxmlformats.org/officeDocument/2006/relationships" xmlns:mc="http://schemas.openxmlformats.org/markup-compatibility/2006" xmlns:mv="urn:schemas-microsoft-com:mac:vml" xmlns:p="http://schemas.openxmlformats.org/presentationml/2006/main" xmlns:c="http://schemas.openxmlformats.org/drawingml/2006/chart" xmlns:dgm="http://schemas.openxmlformats.org/drawingml/2006/diagram" xmlns:o="urn:schemas-microsoft-com:office:office" xmlns:v="urn:schemas-microsoft-com:vml" xmlns:pvml="urn:schemas-microsoft-com:office:powerpoint" xmlns:com="http://schemas.openxmlformats.org/drawingml/2006/compatibility" xmlns:p14="http://schemas.microsoft.com/office/powerpoint/2010/main" xmlns:p15="http://schemas.microsoft.com/office/powerpoint/2012/main" xmlns:ahyp="http://schemas.microsoft.com/office/drawing/2018/hyperlinkcolor">
+  <p:cSld>
+    <p:spTree>
+      <p:nvGrpSpPr>
+        <p:cNvPr id="126" name="Shape 126"/>
+        <p:cNvGrpSpPr/>
+        <p:nvPr/>
+      </p:nvGrpSpPr>
+      <p:grpSpPr>
+        <a:xfrm>
+          <a:off x="0" y="0"/>
+          <a:ext cx="0" cy="0"/>
+          <a:chOff x="0" y="0"/>
+          <a:chExt cx="0" cy="0"/>
+        </a:xfrm>
+      </p:grpSpPr>
+      <p:sp>
+        <p:nvSpPr>
+          <p:cNvPr id="127" name="Google Shape;127;p20"/>
+          <p:cNvSpPr txBox="1"/>
+          <p:nvPr>
+            <p:ph type="title"/>
+          </p:nvPr>
+        </p:nvSpPr>
+        <p:spPr>
+          <a:xfrm>
+            <a:off x="311700" y="410000"/>
+            <a:ext cx="8520600" cy="607800"/>
+          </a:xfrm>
+          <a:prstGeom prst="rect">
+            <a:avLst/>
+          </a:prstGeom>
+        </p:spPr>
+        <p:txBody>
+          <a:bodyPr anchorCtr="0" anchor="t" bIns="91425" lIns="91425" spcFirstLastPara="1" rIns="91425" wrap="square" tIns="91425">
+            <a:normAutofit fontScale="90000"/>
+          </a:bodyPr>
+          <a:lstStyle/>
+          <a:p>
+            <a:pPr indent="0" lvl="0" marL="0" rtl="0" algn="l">
+              <a:spcBef>
+                <a:spcPts val="0"/>
+              </a:spcBef>
+              <a:spcAft>
+                <a:spcPts val="0"/>
+              </a:spcAft>
+              <a:buNone/>
+            </a:pPr>
+            <a:r>
+              <a:rPr lang="en"/>
+              <a:t>Technologies Used</a:t>
+            </a:r>
+            <a:endParaRPr/>
+          </a:p>
+        </p:txBody>
+      </p:sp>
+      <p:sp>
+        <p:nvSpPr>
+          <p:cNvPr id="128" name="Google Shape;128;p20"/>
+          <p:cNvSpPr txBox="1"/>
+          <p:nvPr>
+            <p:ph idx="1" type="body"/>
+          </p:nvPr>
+        </p:nvSpPr>
+        <p:spPr>
+          <a:xfrm>
+            <a:off x="311700" y="1229875"/>
+            <a:ext cx="8520600" cy="3339000"/>
+          </a:xfrm>
+          <a:prstGeom prst="rect">
+            <a:avLst/>
+          </a:prstGeom>
+        </p:spPr>
+        <p:txBody>
+          <a:bodyPr anchorCtr="0" anchor="t" bIns="91425" lIns="91425" spcFirstLastPara="1" rIns="91425" wrap="square" tIns="91425">
+            <a:normAutofit/>
+          </a:bodyPr>
+          <a:lstStyle/>
+          <a:p>
+            <a:pPr indent="0" lvl="0" marL="0" rtl="0" algn="l">
+              <a:spcBef>
+                <a:spcPts val="0"/>
+              </a:spcBef>
+              <a:spcAft>
+                <a:spcPts val="1200"/>
+              </a:spcAft>
+              <a:buNone/>
+            </a:pPr>
+            <a:r>
+              <a:t/>
+            </a:r>
+            <a:endParaRPr/>
+          </a:p>
+        </p:txBody>
+      </p:sp>
+    </p:spTree>
+  </p:cSld>
+  <p:clrMapOvr>
+    <a:masterClrMapping/>
+  </p:clrMapOvr>
+</p:sld>
+</file>
+
+<file path=ppt/slides/slide9.xml><?xml version="1.0" encoding="utf-8"?>
+<p:sld xmlns:a="http://schemas.openxmlformats.org/drawingml/2006/main" xmlns:r="http://schemas.openxmlformats.org/officeDocument/2006/relationships" xmlns:mc="http://schemas.openxmlformats.org/markup-compatibility/2006" xmlns:mv="urn:schemas-microsoft-com:mac:vml" xmlns:p="http://schemas.openxmlformats.org/presentationml/2006/main" xmlns:c="http://schemas.openxmlformats.org/drawingml/2006/chart" xmlns:dgm="http://schemas.openxmlformats.org/drawingml/2006/diagram" xmlns:o="urn:schemas-microsoft-com:office:office" xmlns:v="urn:schemas-microsoft-com:vml" xmlns:pvml="urn:schemas-microsoft-com:office:powerpoint" xmlns:com="http://schemas.openxmlformats.org/drawingml/2006/compatibility" xmlns:p14="http://schemas.microsoft.com/office/powerpoint/2010/main" xmlns:p15="http://schemas.microsoft.com/office/powerpoint/2012/main" xmlns:ahyp="http://schemas.microsoft.com/office/drawing/2018/hyperlinkcolor">
+  <p:cSld>
+    <p:spTree>
+      <p:nvGrpSpPr>
+        <p:cNvPr id="132" name="Shape 132"/>
+        <p:cNvGrpSpPr/>
+        <p:nvPr/>
+      </p:nvGrpSpPr>
+      <p:grpSpPr>
+        <a:xfrm>
+          <a:off x="0" y="0"/>
+          <a:ext cx="0" cy="0"/>
+          <a:chOff x="0" y="0"/>
+          <a:chExt cx="0" cy="0"/>
+        </a:xfrm>
+      </p:grpSpPr>
+      <p:sp>
+        <p:nvSpPr>
+          <p:cNvPr id="133" name="Google Shape;133;p21"/>
+          <p:cNvSpPr txBox="1"/>
+          <p:nvPr>
+            <p:ph type="title"/>
+          </p:nvPr>
+        </p:nvSpPr>
+        <p:spPr>
+          <a:xfrm>
+            <a:off x="311700" y="410000"/>
+            <a:ext cx="8520600" cy="607800"/>
+          </a:xfrm>
+          <a:prstGeom prst="rect">
+            <a:avLst/>
+          </a:prstGeom>
+        </p:spPr>
+        <p:txBody>
+          <a:bodyPr anchorCtr="0" anchor="t" bIns="91425" lIns="91425" spcFirstLastPara="1" rIns="91425" wrap="square" tIns="91425">
+            <a:normAutofit fontScale="90000"/>
+          </a:bodyPr>
+          <a:lstStyle/>
+          <a:p>
+            <a:pPr indent="0" lvl="0" marL="0" rtl="0" algn="l">
+              <a:spcBef>
+                <a:spcPts val="0"/>
+              </a:spcBef>
+              <a:spcAft>
+                <a:spcPts val="0"/>
+              </a:spcAft>
+              <a:buNone/>
+            </a:pPr>
+            <a:r>
+              <a:rPr lang="en"/>
+              <a:t>Analysis Results</a:t>
+            </a:r>
+            <a:endParaRPr/>
+          </a:p>
+        </p:txBody>
+      </p:sp>
+      <p:sp>
+        <p:nvSpPr>
+          <p:cNvPr id="134" name="Google Shape;134;p21"/>
+          <p:cNvSpPr txBox="1"/>
+          <p:nvPr>
+            <p:ph idx="1" type="body"/>
+          </p:nvPr>
+        </p:nvSpPr>
+        <p:spPr>
+          <a:xfrm>
+            <a:off x="311700" y="1229875"/>
+            <a:ext cx="8520600" cy="3339000"/>
+          </a:xfrm>
+          <a:prstGeom prst="rect">
+            <a:avLst/>
+          </a:prstGeom>
+        </p:spPr>
+        <p:txBody>
+          <a:bodyPr anchorCtr="0" anchor="t" bIns="91425" lIns="91425" spcFirstLastPara="1" rIns="91425" wrap="square" tIns="91425">
+            <a:normAutofit/>
+          </a:bodyPr>
+          <a:lstStyle/>
+          <a:p>
+            <a:pPr indent="0" lvl="0" marL="0" rtl="0" algn="l">
+              <a:spcBef>
+                <a:spcPts val="0"/>
+              </a:spcBef>
+              <a:spcAft>
+                <a:spcPts val="1200"/>
+              </a:spcAft>
+              <a:buNone/>
             </a:pPr>
             <a:r>
               <a:t/>

</xml_diff>

<commit_message>
added ERD and updated power point
</commit_message>
<xml_diff>
--- a/SlideShow/Data Analytics Final Presentation.pptx
+++ b/SlideShow/Data Analytics Final Presentation.pptx
@@ -9271,7 +9271,84 @@
               <a:buChar char="●"/>
             </a:pPr>
             <a:r>
+              <a:rPr lang="en"/>
+              <a:t>The data set was very complete and gives us plenty of data to work with</a:t>
+            </a:r>
+            <a:endParaRPr/>
+          </a:p>
+          <a:p>
+            <a:pPr indent="0" lvl="0" marL="0" rtl="0" algn="l">
+              <a:spcBef>
+                <a:spcPts val="1200"/>
+              </a:spcBef>
+              <a:spcAft>
+                <a:spcPts val="0"/>
+              </a:spcAft>
+              <a:buNone/>
+            </a:pPr>
+            <a:r>
               <a:t/>
+            </a:r>
+            <a:endParaRPr/>
+          </a:p>
+          <a:p>
+            <a:pPr indent="-342900" lvl="0" marL="457200" rtl="0" algn="l">
+              <a:spcBef>
+                <a:spcPts val="1200"/>
+              </a:spcBef>
+              <a:spcAft>
+                <a:spcPts val="0"/>
+              </a:spcAft>
+              <a:buSzPts val="1800"/>
+              <a:buChar char="●"/>
+            </a:pPr>
+            <a:r>
+              <a:rPr lang="en"/>
+              <a:t>The data gives many </a:t>
+            </a:r>
+            <a:r>
+              <a:rPr lang="en"/>
+              <a:t>variables</a:t>
+            </a:r>
+            <a:r>
+              <a:rPr lang="en"/>
+              <a:t> that </a:t>
+            </a:r>
+            <a:r>
+              <a:rPr lang="en"/>
+              <a:t>will help the strength of the machine learning model</a:t>
+            </a:r>
+            <a:endParaRPr/>
+          </a:p>
+          <a:p>
+            <a:pPr indent="0" lvl="0" marL="0" rtl="0" algn="l">
+              <a:spcBef>
+                <a:spcPts val="1200"/>
+              </a:spcBef>
+              <a:spcAft>
+                <a:spcPts val="0"/>
+              </a:spcAft>
+              <a:buNone/>
+            </a:pPr>
+            <a:r>
+              <a:t/>
+            </a:r>
+            <a:endParaRPr/>
+          </a:p>
+          <a:p>
+            <a:pPr indent="-342900" lvl="0" marL="457200" rtl="0" algn="l">
+              <a:spcBef>
+                <a:spcPts val="1200"/>
+              </a:spcBef>
+              <a:spcAft>
+                <a:spcPts val="0"/>
+              </a:spcAft>
+              <a:buSzPts val="1800"/>
+              <a:buChar char="●"/>
+            </a:pPr>
+            <a:r>
+              <a:rPr lang="en"/>
+              <a:t>The results of our analysis could prove valuable to customers and airlines alike</a:t>
             </a:r>
             <a:endParaRPr/>
           </a:p>

</xml_diff>